<commit_message>
RACR-NET (documentation): Updated title page; fixed colour artefact in region transition.
</commit_message>
<xml_diff>
--- a/racr-net/documentation/figures/title.pptx
+++ b/racr-net/documentation/figures/title.pptx
@@ -288,7 +288,7 @@
           <a:p>
             <a:fld id="{352FA614-CB86-F746-BBDB-B09DC1C1C820}" type="datetimeFigureOut">
               <a:rPr lang="en-US" smtClean="0"/>
-              <a:t>11/12/15</a:t>
+              <a:t>11/05/16</a:t>
             </a:fld>
             <a:endParaRPr lang="en-GB"/>
           </a:p>
@@ -458,7 +458,7 @@
           <a:p>
             <a:fld id="{352FA614-CB86-F746-BBDB-B09DC1C1C820}" type="datetimeFigureOut">
               <a:rPr lang="en-US" smtClean="0"/>
-              <a:t>11/12/15</a:t>
+              <a:t>11/05/16</a:t>
             </a:fld>
             <a:endParaRPr lang="en-GB"/>
           </a:p>
@@ -638,7 +638,7 @@
           <a:p>
             <a:fld id="{352FA614-CB86-F746-BBDB-B09DC1C1C820}" type="datetimeFigureOut">
               <a:rPr lang="en-US" smtClean="0"/>
-              <a:t>11/12/15</a:t>
+              <a:t>11/05/16</a:t>
             </a:fld>
             <a:endParaRPr lang="en-GB"/>
           </a:p>
@@ -808,7 +808,7 @@
           <a:p>
             <a:fld id="{352FA614-CB86-F746-BBDB-B09DC1C1C820}" type="datetimeFigureOut">
               <a:rPr lang="en-US" smtClean="0"/>
-              <a:t>11/12/15</a:t>
+              <a:t>11/05/16</a:t>
             </a:fld>
             <a:endParaRPr lang="en-GB"/>
           </a:p>
@@ -1054,7 +1054,7 @@
           <a:p>
             <a:fld id="{352FA614-CB86-F746-BBDB-B09DC1C1C820}" type="datetimeFigureOut">
               <a:rPr lang="en-US" smtClean="0"/>
-              <a:t>11/12/15</a:t>
+              <a:t>11/05/16</a:t>
             </a:fld>
             <a:endParaRPr lang="en-GB"/>
           </a:p>
@@ -1342,7 +1342,7 @@
           <a:p>
             <a:fld id="{352FA614-CB86-F746-BBDB-B09DC1C1C820}" type="datetimeFigureOut">
               <a:rPr lang="en-US" smtClean="0"/>
-              <a:t>11/12/15</a:t>
+              <a:t>11/05/16</a:t>
             </a:fld>
             <a:endParaRPr lang="en-GB"/>
           </a:p>
@@ -1769,7 +1769,7 @@
           <a:p>
             <a:fld id="{352FA614-CB86-F746-BBDB-B09DC1C1C820}" type="datetimeFigureOut">
               <a:rPr lang="en-US" smtClean="0"/>
-              <a:t>11/12/15</a:t>
+              <a:t>11/05/16</a:t>
             </a:fld>
             <a:endParaRPr lang="en-GB"/>
           </a:p>
@@ -1887,7 +1887,7 @@
           <a:p>
             <a:fld id="{352FA614-CB86-F746-BBDB-B09DC1C1C820}" type="datetimeFigureOut">
               <a:rPr lang="en-US" smtClean="0"/>
-              <a:t>11/12/15</a:t>
+              <a:t>11/05/16</a:t>
             </a:fld>
             <a:endParaRPr lang="en-GB"/>
           </a:p>
@@ -1982,7 +1982,7 @@
           <a:p>
             <a:fld id="{352FA614-CB86-F746-BBDB-B09DC1C1C820}" type="datetimeFigureOut">
               <a:rPr lang="en-US" smtClean="0"/>
-              <a:t>11/12/15</a:t>
+              <a:t>11/05/16</a:t>
             </a:fld>
             <a:endParaRPr lang="en-GB"/>
           </a:p>
@@ -2259,7 +2259,7 @@
           <a:p>
             <a:fld id="{352FA614-CB86-F746-BBDB-B09DC1C1C820}" type="datetimeFigureOut">
               <a:rPr lang="en-US" smtClean="0"/>
-              <a:t>11/12/15</a:t>
+              <a:t>11/05/16</a:t>
             </a:fld>
             <a:endParaRPr lang="en-GB"/>
           </a:p>
@@ -2512,7 +2512,7 @@
           <a:p>
             <a:fld id="{352FA614-CB86-F746-BBDB-B09DC1C1C820}" type="datetimeFigureOut">
               <a:rPr lang="en-US" smtClean="0"/>
-              <a:t>11/12/15</a:t>
+              <a:t>11/05/16</a:t>
             </a:fld>
             <a:endParaRPr lang="en-GB"/>
           </a:p>
@@ -2797,7 +2797,7 @@
           <a:p>
             <a:fld id="{352FA614-CB86-F746-BBDB-B09DC1C1C820}" type="datetimeFigureOut">
               <a:rPr lang="en-US" smtClean="0"/>
-              <a:t>11/12/15</a:t>
+              <a:t>11/05/16</a:t>
             </a:fld>
             <a:endParaRPr lang="en-GB"/>
           </a:p>
@@ -8020,8 +8020,8 @@
         </p:nvSpPr>
         <p:spPr bwMode="auto">
           <a:xfrm>
-            <a:off x="404665" y="7329264"/>
-            <a:ext cx="6122118" cy="144016"/>
+            <a:off x="404665" y="7329267"/>
+            <a:ext cx="2580338" cy="144013"/>
           </a:xfrm>
           <a:prstGeom prst="rect">
             <a:avLst/>
@@ -12060,53 +12060,6 @@
           </p:sp>
         </p:grpSp>
       </p:grpSp>
-      <p:sp>
-        <p:nvSpPr>
-          <p:cNvPr id="1277" name="Rechteck 3"/>
-          <p:cNvSpPr/>
-          <p:nvPr/>
-        </p:nvSpPr>
-        <p:spPr bwMode="auto">
-          <a:xfrm>
-            <a:off x="404664" y="2432721"/>
-            <a:ext cx="6120679" cy="6768752"/>
-          </a:xfrm>
-          <a:prstGeom prst="rect">
-            <a:avLst/>
-          </a:prstGeom>
-          <a:noFill/>
-          <a:ln w="19050" cap="flat" cmpd="sng" algn="ctr">
-            <a:solidFill>
-              <a:schemeClr val="tx1"/>
-            </a:solidFill>
-            <a:prstDash val="solid"/>
-            <a:round/>
-            <a:headEnd type="none" w="med" len="med"/>
-            <a:tailEnd type="none" w="med" len="med"/>
-          </a:ln>
-          <a:effectLst/>
-        </p:spPr>
-        <p:txBody>
-          <a:bodyPr vert="horz" wrap="square" lIns="91440" tIns="45720" rIns="91440" bIns="45720" numCol="1" rtlCol="0" anchor="t" anchorCtr="0" compatLnSpc="1">
-            <a:prstTxWarp prst="textNoShape">
-              <a:avLst/>
-            </a:prstTxWarp>
-          </a:bodyPr>
-          <a:lstStyle/>
-          <a:p>
-            <a:pPr defTabSz="914323"/>
-            <a:endParaRPr kumimoji="0" lang="de-DE" b="1" i="0" u="none" strike="noStrike" cap="none" normalizeH="0" baseline="0" smtClean="0">
-              <a:ln>
-                <a:noFill/>
-              </a:ln>
-              <a:solidFill>
-                <a:schemeClr val="bg2"/>
-              </a:solidFill>
-              <a:effectLst/>
-            </a:endParaRPr>
-          </a:p>
-        </p:txBody>
-      </p:sp>
       <p:grpSp>
         <p:nvGrpSpPr>
           <p:cNvPr id="1016" name="Group 1015"/>
@@ -12618,16 +12571,7 @@
                   </a:solidFill>
                   <a:cs typeface="Microsoft Sans Serif"/>
                 </a:rPr>
-                <a:t>”</a:t>
-              </a:r>
-              <a:r>
-                <a:rPr lang="en-GB" sz="500" dirty="0" smtClean="0">
-                  <a:solidFill>
-                    <a:schemeClr val="tx1"/>
-                  </a:solidFill>
-                  <a:cs typeface="Microsoft Sans Serif"/>
-                </a:rPr>
-                <a:t>)</a:t>
+                <a:t>”)</a:t>
               </a:r>
             </a:p>
             <a:p>
@@ -12965,16 +12909,7 @@
                   </a:solidFill>
                   <a:cs typeface="Microsoft Sans Serif"/>
                 </a:rPr>
-                <a:t>c5.Child("A”</a:t>
-              </a:r>
-              <a:r>
-                <a:rPr lang="it-IT" sz="500" dirty="0" smtClean="0">
-                  <a:solidFill>
-                    <a:schemeClr val="tx1"/>
-                  </a:solidFill>
-                  <a:cs typeface="Microsoft Sans Serif"/>
-                </a:rPr>
-                <a:t>)</a:t>
+                <a:t>c5.Child("A”)</a:t>
               </a:r>
               <a:endParaRPr lang="en-GB" sz="500" dirty="0">
                 <a:solidFill>
@@ -13005,16 +12940,7 @@
                   </a:solidFill>
                   <a:cs typeface="Microsoft Sans Serif"/>
                 </a:rPr>
-                <a:t>c6</a:t>
-              </a:r>
-              <a:r>
-                <a:rPr lang="en-GB" sz="500" dirty="0" smtClean="0">
-                  <a:solidFill>
-                    <a:schemeClr val="tx1"/>
-                  </a:solidFill>
-                  <a:cs typeface="Microsoft Sans Serif"/>
-                </a:rPr>
-                <a:t>.AttValue("</a:t>
+                <a:t>c6.AttValue("</a:t>
               </a:r>
               <a:r>
                 <a:rPr lang="en-GB" sz="500" dirty="0" err="1" smtClean="0">
@@ -13032,23 +12958,8 @@
                   </a:solidFill>
                   <a:cs typeface="Microsoft Sans Serif"/>
                 </a:rPr>
-                <a:t>”</a:t>
-              </a:r>
-              <a:r>
-                <a:rPr lang="en-GB" sz="500" dirty="0" smtClean="0">
-                  <a:solidFill>
-                    <a:schemeClr val="tx1"/>
-                  </a:solidFill>
-                  <a:cs typeface="Microsoft Sans Serif"/>
-                </a:rPr>
-                <a:t>)</a:t>
-              </a:r>
-              <a:endParaRPr lang="en-GB" sz="500" dirty="0" smtClean="0">
-                <a:solidFill>
-                  <a:schemeClr val="tx1"/>
-                </a:solidFill>
-                <a:cs typeface="Microsoft Sans Serif"/>
-              </a:endParaRPr>
+                <a:t>”)</a:t>
+              </a:r>
             </a:p>
             <a:p>
               <a:pPr algn="r"/>
@@ -13103,25 +13014,7 @@
                   </a:solidFill>
                   <a:cs typeface="Microsoft Sans Serif"/>
                 </a:rPr>
-                <a:t>c5</a:t>
-              </a:r>
-              <a:r>
-                <a:rPr lang="it-IT" sz="500" dirty="0" smtClean="0">
-                  <a:solidFill>
-                    <a:schemeClr val="tx1"/>
-                  </a:solidFill>
-                  <a:cs typeface="Microsoft Sans Serif"/>
-                </a:rPr>
-                <a:t>.Child("B”</a:t>
-              </a:r>
-              <a:r>
-                <a:rPr lang="it-IT" sz="500" dirty="0" smtClean="0">
-                  <a:solidFill>
-                    <a:schemeClr val="tx1"/>
-                  </a:solidFill>
-                  <a:cs typeface="Microsoft Sans Serif"/>
-                </a:rPr>
-                <a:t>)</a:t>
+                <a:t>c5.Child("B”)</a:t>
               </a:r>
             </a:p>
             <a:p>
@@ -13292,16 +13185,7 @@
                   </a:solidFill>
                   <a:cs typeface="Microsoft Sans Serif"/>
                 </a:rPr>
-                <a:t>c7.Child("A”</a:t>
-              </a:r>
-              <a:r>
-                <a:rPr lang="it-IT" sz="500" dirty="0" smtClean="0">
-                  <a:solidFill>
-                    <a:schemeClr val="tx1"/>
-                  </a:solidFill>
-                  <a:cs typeface="Microsoft Sans Serif"/>
-                </a:rPr>
-                <a:t>)</a:t>
+                <a:t>c7.Child("A”)</a:t>
               </a:r>
               <a:endParaRPr lang="it-IT" sz="500" dirty="0">
                 <a:solidFill>
@@ -13542,16 +13426,7 @@
                   </a:solidFill>
                   <a:cs typeface="Microsoft Sans Serif"/>
                 </a:rPr>
-                <a:t>c7.Child("B”</a:t>
-              </a:r>
-              <a:r>
-                <a:rPr lang="it-IT" sz="500" dirty="0" smtClean="0">
-                  <a:solidFill>
-                    <a:schemeClr val="tx1"/>
-                  </a:solidFill>
-                  <a:cs typeface="Microsoft Sans Serif"/>
-                </a:rPr>
-                <a:t>)</a:t>
+                <a:t>c7.Child("B”)</a:t>
               </a:r>
               <a:endParaRPr lang="it-IT" sz="500" dirty="0">
                 <a:solidFill>
@@ -13700,16 +13575,7 @@
                   </a:solidFill>
                   <a:cs typeface="Microsoft Sans Serif"/>
                 </a:rPr>
-                <a:t>”</a:t>
-              </a:r>
-              <a:r>
-                <a:rPr lang="it-IT" sz="500" dirty="0" smtClean="0">
-                  <a:solidFill>
-                    <a:schemeClr val="tx1"/>
-                  </a:solidFill>
-                  <a:cs typeface="Microsoft Sans Serif"/>
-                </a:rPr>
-                <a:t>)</a:t>
+                <a:t>”)</a:t>
               </a:r>
               <a:endParaRPr lang="it-IT" sz="500" dirty="0">
                 <a:solidFill>
@@ -13929,12 +13795,6 @@
                 </a:rPr>
                 <a:t>“)</a:t>
               </a:r>
-              <a:endParaRPr lang="de-DE" sz="500" dirty="0" smtClean="0">
-                <a:solidFill>
-                  <a:schemeClr val="tx1"/>
-                </a:solidFill>
-                <a:cs typeface="Microsoft Sans Serif"/>
-              </a:endParaRPr>
             </a:p>
           </p:txBody>
         </p:sp>
@@ -14006,16 +13866,7 @@
                   </a:solidFill>
                   <a:cs typeface="Microsoft Sans Serif"/>
                 </a:rPr>
-                <a:t>”</a:t>
-              </a:r>
-              <a:r>
-                <a:rPr lang="it-IT" sz="500" dirty="0" smtClean="0">
-                  <a:solidFill>
-                    <a:schemeClr val="tx1"/>
-                  </a:solidFill>
-                  <a:cs typeface="Microsoft Sans Serif"/>
-                </a:rPr>
-                <a:t>)</a:t>
+                <a:t>”)</a:t>
               </a:r>
               <a:endParaRPr lang="it-IT" sz="500" dirty="0">
                 <a:solidFill>
@@ -17561,6 +17412,122 @@
           </p:style>
         </p:cxnSp>
       </p:grpSp>
+      <p:sp>
+        <p:nvSpPr>
+          <p:cNvPr id="264" name="Rectangle 263"/>
+          <p:cNvSpPr/>
+          <p:nvPr/>
+        </p:nvSpPr>
+        <p:spPr bwMode="auto">
+          <a:xfrm>
+            <a:off x="2985003" y="7329267"/>
+            <a:ext cx="3540338" cy="144013"/>
+          </a:xfrm>
+          <a:prstGeom prst="rect">
+            <a:avLst/>
+          </a:prstGeom>
+          <a:pattFill prst="wdDnDiag">
+            <a:fgClr>
+              <a:schemeClr val="bg1">
+                <a:lumMod val="75000"/>
+              </a:schemeClr>
+            </a:fgClr>
+            <a:bgClr>
+              <a:schemeClr val="bg1"/>
+            </a:bgClr>
+          </a:pattFill>
+          <a:ln w="9525" cap="flat" cmpd="sng" algn="ctr">
+            <a:noFill/>
+            <a:prstDash val="solid"/>
+            <a:round/>
+            <a:headEnd type="none" w="med" len="med"/>
+            <a:tailEnd type="none" w="med" len="med"/>
+          </a:ln>
+          <a:effectLst/>
+        </p:spPr>
+        <p:txBody>
+          <a:bodyPr vert="horz" wrap="square" lIns="91440" tIns="45720" rIns="91440" bIns="45720" numCol="1" rtlCol="0" anchor="t" anchorCtr="0" compatLnSpc="1">
+            <a:prstTxWarp prst="textNoShape">
+              <a:avLst/>
+            </a:prstTxWarp>
+          </a:bodyPr>
+          <a:lstStyle/>
+          <a:p>
+            <a:pPr marL="0" marR="0" indent="0" algn="l" defTabSz="914400" rtl="0" eaLnBrk="1" fontAlgn="base" latinLnBrk="0" hangingPunct="1">
+              <a:lnSpc>
+                <a:spcPct val="100000"/>
+              </a:lnSpc>
+              <a:spcBef>
+                <a:spcPct val="0"/>
+              </a:spcBef>
+              <a:spcAft>
+                <a:spcPct val="0"/>
+              </a:spcAft>
+              <a:buClrTx/>
+              <a:buSzTx/>
+              <a:buFontTx/>
+              <a:buNone/>
+              <a:tabLst/>
+            </a:pPr>
+            <a:endParaRPr kumimoji="0" lang="en-GB" sz="1000" b="1" i="0" u="none" strike="noStrike" cap="none" normalizeH="0" baseline="0" smtClean="0">
+              <a:ln>
+                <a:noFill/>
+              </a:ln>
+              <a:solidFill>
+                <a:schemeClr val="bg2"/>
+              </a:solidFill>
+              <a:effectLst/>
+            </a:endParaRPr>
+          </a:p>
+        </p:txBody>
+      </p:sp>
+      <p:sp>
+        <p:nvSpPr>
+          <p:cNvPr id="1277" name="Rechteck 3"/>
+          <p:cNvSpPr/>
+          <p:nvPr/>
+        </p:nvSpPr>
+        <p:spPr bwMode="auto">
+          <a:xfrm>
+            <a:off x="404664" y="2432721"/>
+            <a:ext cx="6120679" cy="6768752"/>
+          </a:xfrm>
+          <a:prstGeom prst="rect">
+            <a:avLst/>
+          </a:prstGeom>
+          <a:noFill/>
+          <a:ln w="19050" cap="flat" cmpd="sng" algn="ctr">
+            <a:solidFill>
+              <a:schemeClr val="tx1"/>
+            </a:solidFill>
+            <a:prstDash val="solid"/>
+            <a:round/>
+            <a:headEnd type="none" w="med" len="med"/>
+            <a:tailEnd type="none" w="med" len="med"/>
+          </a:ln>
+          <a:effectLst/>
+        </p:spPr>
+        <p:txBody>
+          <a:bodyPr vert="horz" wrap="square" lIns="91440" tIns="45720" rIns="91440" bIns="45720" numCol="1" rtlCol="0" anchor="t" anchorCtr="0" compatLnSpc="1">
+            <a:prstTxWarp prst="textNoShape">
+              <a:avLst/>
+            </a:prstTxWarp>
+          </a:bodyPr>
+          <a:lstStyle/>
+          <a:p>
+            <a:pPr defTabSz="914323"/>
+            <a:endParaRPr kumimoji="0" lang="de-DE" b="1" i="0" u="none" strike="noStrike" cap="none" normalizeH="0" baseline="0" smtClean="0">
+              <a:ln>
+                <a:noFill/>
+              </a:ln>
+              <a:solidFill>
+                <a:schemeClr val="bg2"/>
+              </a:solidFill>
+              <a:effectLst/>
+            </a:endParaRPr>
+          </a:p>
+        </p:txBody>
+      </p:sp>
     </p:spTree>
     <p:extLst>
       <p:ext uri="{BB962C8B-B14F-4D97-AF65-F5344CB8AC3E}">

</xml_diff>